<commit_message>
Updated presentations, eff and sine scripts
</commit_message>
<xml_diff>
--- a/Presentation.pptx
+++ b/Presentation.pptx
@@ -8,8 +8,8 @@
     <p:notesMasterId r:id="rId17"/>
   </p:notesMasterIdLst>
   <p:sldIdLst>
-    <p:sldId id="256" r:id="rId2"/>
-    <p:sldId id="261" r:id="rId3"/>
+    <p:sldId id="277" r:id="rId2"/>
+    <p:sldId id="278" r:id="rId3"/>
     <p:sldId id="262" r:id="rId4"/>
     <p:sldId id="257" r:id="rId5"/>
     <p:sldId id="258" r:id="rId6"/>
@@ -22,7 +22,7 @@
     <p:sldId id="275" r:id="rId13"/>
     <p:sldId id="271" r:id="rId14"/>
     <p:sldId id="270" r:id="rId15"/>
-    <p:sldId id="272" r:id="rId16"/>
+    <p:sldId id="276" r:id="rId16"/>
   </p:sldIdLst>
   <p:sldSz cx="12192000" cy="6858000"/>
   <p:notesSz cx="6858000" cy="9144000"/>
@@ -544,7 +544,7 @@
           <a:p>
             <a:fld id="{00760813-E5DE-4089-B4EA-696168FB0A91}" type="slidenum">
               <a:rPr lang="en-IL" smtClean="0"/>
-              <a:t>3</a:t>
+              <a:t>2</a:t>
             </a:fld>
             <a:endParaRPr lang="en-IL"/>
           </a:p>
@@ -553,7 +553,7 @@
     </p:spTree>
     <p:extLst>
       <p:ext uri="{BB962C8B-B14F-4D97-AF65-F5344CB8AC3E}">
-        <p14:creationId xmlns:p14="http://schemas.microsoft.com/office/powerpoint/2010/main" val="520748308"/>
+        <p14:creationId xmlns:p14="http://schemas.microsoft.com/office/powerpoint/2010/main" val="828933396"/>
       </p:ext>
     </p:extLst>
   </p:cSld>
@@ -628,7 +628,7 @@
           <a:p>
             <a:fld id="{00760813-E5DE-4089-B4EA-696168FB0A91}" type="slidenum">
               <a:rPr lang="en-IL" smtClean="0"/>
-              <a:t>8</a:t>
+              <a:t>3</a:t>
             </a:fld>
             <a:endParaRPr lang="en-IL"/>
           </a:p>
@@ -637,7 +637,7 @@
     </p:spTree>
     <p:extLst>
       <p:ext uri="{BB962C8B-B14F-4D97-AF65-F5344CB8AC3E}">
-        <p14:creationId xmlns:p14="http://schemas.microsoft.com/office/powerpoint/2010/main" val="1778760440"/>
+        <p14:creationId xmlns:p14="http://schemas.microsoft.com/office/powerpoint/2010/main" val="520748308"/>
       </p:ext>
     </p:extLst>
   </p:cSld>
@@ -712,7 +712,7 @@
           <a:p>
             <a:fld id="{00760813-E5DE-4089-B4EA-696168FB0A91}" type="slidenum">
               <a:rPr lang="en-IL" smtClean="0"/>
-              <a:t>12</a:t>
+              <a:t>8</a:t>
             </a:fld>
             <a:endParaRPr lang="en-IL"/>
           </a:p>
@@ -721,7 +721,7 @@
     </p:spTree>
     <p:extLst>
       <p:ext uri="{BB962C8B-B14F-4D97-AF65-F5344CB8AC3E}">
-        <p14:creationId xmlns:p14="http://schemas.microsoft.com/office/powerpoint/2010/main" val="358012472"/>
+        <p14:creationId xmlns:p14="http://schemas.microsoft.com/office/powerpoint/2010/main" val="1778760440"/>
       </p:ext>
     </p:extLst>
   </p:cSld>
@@ -796,7 +796,7 @@
           <a:p>
             <a:fld id="{00760813-E5DE-4089-B4EA-696168FB0A91}" type="slidenum">
               <a:rPr lang="en-IL" smtClean="0"/>
-              <a:t>15</a:t>
+              <a:t>12</a:t>
             </a:fld>
             <a:endParaRPr lang="en-IL"/>
           </a:p>
@@ -805,7 +805,91 @@
     </p:spTree>
     <p:extLst>
       <p:ext uri="{BB962C8B-B14F-4D97-AF65-F5344CB8AC3E}">
-        <p14:creationId xmlns:p14="http://schemas.microsoft.com/office/powerpoint/2010/main" val="951725252"/>
+        <p14:creationId xmlns:p14="http://schemas.microsoft.com/office/powerpoint/2010/main" val="358012472"/>
+      </p:ext>
+    </p:extLst>
+  </p:cSld>
+  <p:clrMapOvr>
+    <a:masterClrMapping/>
+  </p:clrMapOvr>
+</p:notes>
+</file>
+
+<file path=ppt/notesSlides/notesSlide5.xml><?xml version="1.0" encoding="utf-8"?>
+<p:notes xmlns:a="http://schemas.openxmlformats.org/drawingml/2006/main" xmlns:r="http://schemas.openxmlformats.org/officeDocument/2006/relationships" xmlns:p="http://schemas.openxmlformats.org/presentationml/2006/main">
+  <p:cSld>
+    <p:spTree>
+      <p:nvGrpSpPr>
+        <p:cNvPr id="1" name=""/>
+        <p:cNvGrpSpPr/>
+        <p:nvPr/>
+      </p:nvGrpSpPr>
+      <p:grpSpPr>
+        <a:xfrm>
+          <a:off x="0" y="0"/>
+          <a:ext cx="0" cy="0"/>
+          <a:chOff x="0" y="0"/>
+          <a:chExt cx="0" cy="0"/>
+        </a:xfrm>
+      </p:grpSpPr>
+      <p:sp>
+        <p:nvSpPr>
+          <p:cNvPr id="2" name="Slide Image Placeholder 1"/>
+          <p:cNvSpPr>
+            <a:spLocks noGrp="1" noRot="1" noChangeAspect="1"/>
+          </p:cNvSpPr>
+          <p:nvPr>
+            <p:ph type="sldImg"/>
+          </p:nvPr>
+        </p:nvSpPr>
+        <p:spPr/>
+      </p:sp>
+      <p:sp>
+        <p:nvSpPr>
+          <p:cNvPr id="3" name="Notes Placeholder 2"/>
+          <p:cNvSpPr>
+            <a:spLocks noGrp="1"/>
+          </p:cNvSpPr>
+          <p:nvPr>
+            <p:ph type="body" idx="1"/>
+          </p:nvPr>
+        </p:nvSpPr>
+        <p:spPr/>
+        <p:txBody>
+          <a:bodyPr/>
+          <a:lstStyle/>
+          <a:p>
+            <a:endParaRPr lang="en-IL" dirty="0"/>
+          </a:p>
+        </p:txBody>
+      </p:sp>
+      <p:sp>
+        <p:nvSpPr>
+          <p:cNvPr id="4" name="Slide Number Placeholder 3"/>
+          <p:cNvSpPr>
+            <a:spLocks noGrp="1"/>
+          </p:cNvSpPr>
+          <p:nvPr>
+            <p:ph type="sldNum" sz="quarter" idx="5"/>
+          </p:nvPr>
+        </p:nvSpPr>
+        <p:spPr/>
+        <p:txBody>
+          <a:bodyPr/>
+          <a:lstStyle/>
+          <a:p>
+            <a:fld id="{00760813-E5DE-4089-B4EA-696168FB0A91}" type="slidenum">
+              <a:rPr lang="en-IL" smtClean="0"/>
+              <a:t>15</a:t>
+            </a:fld>
+            <a:endParaRPr lang="en-IL"/>
+          </a:p>
+        </p:txBody>
+      </p:sp>
+    </p:spTree>
+    <p:extLst>
+      <p:ext uri="{BB962C8B-B14F-4D97-AF65-F5344CB8AC3E}">
+        <p14:creationId xmlns:p14="http://schemas.microsoft.com/office/powerpoint/2010/main" val="3670996605"/>
       </p:ext>
     </p:extLst>
   </p:cSld>
@@ -4036,14 +4120,6 @@
 <file path=ppt/slides/slide1.xml><?xml version="1.0" encoding="utf-8"?>
 <p:sld xmlns:a="http://schemas.openxmlformats.org/drawingml/2006/main" xmlns:r="http://schemas.openxmlformats.org/officeDocument/2006/relationships" xmlns:p="http://schemas.openxmlformats.org/presentationml/2006/main">
   <p:cSld>
-    <p:bg>
-      <p:bgPr>
-        <a:solidFill>
-          <a:schemeClr val="bg1"/>
-        </a:solidFill>
-        <a:effectLst/>
-      </p:bgPr>
-    </p:bg>
     <p:spTree>
       <p:nvGrpSpPr>
         <p:cNvPr id="1" name=""/>
@@ -4058,141 +4134,12 @@
           <a:chExt cx="0" cy="0"/>
         </a:xfrm>
       </p:grpSpPr>
-      <p:sp>
-        <p:nvSpPr>
-          <p:cNvPr id="10" name="Rectangle 9">
-            <a:extLst>
-              <a:ext uri="{FF2B5EF4-FFF2-40B4-BE49-F238E27FC236}">
-                <a16:creationId xmlns:a16="http://schemas.microsoft.com/office/drawing/2014/main" id="{32BC26D8-82FB-445E-AA49-62A77D7C1EE0}"/>
-              </a:ext>
-              <a:ext uri="{C183D7F6-B498-43B3-948B-1728B52AA6E4}">
-                <adec:decorative xmlns:adec="http://schemas.microsoft.com/office/drawing/2017/decorative" val="1"/>
-              </a:ext>
-            </a:extLst>
-          </p:cNvPr>
-          <p:cNvSpPr>
-            <a:spLocks noGrp="1" noRot="1" noChangeAspect="1" noMove="1" noResize="1" noEditPoints="1" noAdjustHandles="1" noChangeArrowheads="1" noChangeShapeType="1" noTextEdit="1"/>
-          </p:cNvSpPr>
-          <p:nvPr>
-            <p:extLst>
-              <p:ext uri="{386F3935-93C4-4BCD-93E2-E3B085C9AB24}">
-                <p16:designElem xmlns:p16="http://schemas.microsoft.com/office/powerpoint/2015/main" val="1"/>
-              </p:ext>
-            </p:extLst>
-          </p:nvPr>
-        </p:nvSpPr>
-        <p:spPr>
-          <a:xfrm>
-            <a:off x="0" y="0"/>
-            <a:ext cx="12192000" cy="6858000"/>
-          </a:xfrm>
-          <a:prstGeom prst="rect">
-            <a:avLst/>
-          </a:prstGeom>
-          <a:solidFill>
-            <a:schemeClr val="tx1">
-              <a:lumMod val="65000"/>
-              <a:lumOff val="35000"/>
-            </a:schemeClr>
-          </a:solidFill>
-          <a:ln>
-            <a:noFill/>
-          </a:ln>
-        </p:spPr>
-        <p:style>
-          <a:lnRef idx="2">
-            <a:schemeClr val="accent1">
-              <a:shade val="50000"/>
-            </a:schemeClr>
-          </a:lnRef>
-          <a:fillRef idx="1">
-            <a:schemeClr val="accent1"/>
-          </a:fillRef>
-          <a:effectRef idx="0">
-            <a:schemeClr val="accent1"/>
-          </a:effectRef>
-          <a:fontRef idx="minor">
-            <a:schemeClr val="lt1"/>
-          </a:fontRef>
-        </p:style>
-        <p:txBody>
-          <a:bodyPr rtlCol="0" anchor="ctr"/>
-          <a:lstStyle/>
-          <a:p>
-            <a:pPr algn="ctr"/>
-            <a:endParaRPr lang="en-US"/>
-          </a:p>
-        </p:txBody>
-      </p:sp>
-      <p:sp>
-        <p:nvSpPr>
-          <p:cNvPr id="12" name="Rectangle 11">
-            <a:extLst>
-              <a:ext uri="{FF2B5EF4-FFF2-40B4-BE49-F238E27FC236}">
-                <a16:creationId xmlns:a16="http://schemas.microsoft.com/office/drawing/2014/main" id="{CB44330D-EA18-4254-AA95-EB49948539B8}"/>
-              </a:ext>
-              <a:ext uri="{C183D7F6-B498-43B3-948B-1728B52AA6E4}">
-                <adec:decorative xmlns:adec="http://schemas.microsoft.com/office/drawing/2017/decorative" val="1"/>
-              </a:ext>
-            </a:extLst>
-          </p:cNvPr>
-          <p:cNvSpPr>
-            <a:spLocks noGrp="1" noRot="1" noChangeAspect="1" noMove="1" noResize="1" noEditPoints="1" noAdjustHandles="1" noChangeArrowheads="1" noChangeShapeType="1" noTextEdit="1"/>
-          </p:cNvSpPr>
-          <p:nvPr>
-            <p:extLst>
-              <p:ext uri="{386F3935-93C4-4BCD-93E2-E3B085C9AB24}">
-                <p16:designElem xmlns:p16="http://schemas.microsoft.com/office/powerpoint/2015/main" val="1"/>
-              </p:ext>
-            </p:extLst>
-          </p:nvPr>
-        </p:nvSpPr>
-        <p:spPr>
-          <a:xfrm>
-            <a:off x="477012" y="480060"/>
-            <a:ext cx="11237976" cy="5897880"/>
-          </a:xfrm>
-          <a:prstGeom prst="rect">
-            <a:avLst/>
-          </a:prstGeom>
-          <a:solidFill>
-            <a:srgbClr val="FFFFFF"/>
-          </a:solidFill>
-          <a:ln>
-            <a:noFill/>
-          </a:ln>
-        </p:spPr>
-        <p:style>
-          <a:lnRef idx="2">
-            <a:schemeClr val="accent1">
-              <a:shade val="50000"/>
-            </a:schemeClr>
-          </a:lnRef>
-          <a:fillRef idx="1">
-            <a:schemeClr val="accent1"/>
-          </a:fillRef>
-          <a:effectRef idx="0">
-            <a:schemeClr val="accent1"/>
-          </a:effectRef>
-          <a:fontRef idx="minor">
-            <a:schemeClr val="lt1"/>
-          </a:fontRef>
-        </p:style>
-        <p:txBody>
-          <a:bodyPr rtlCol="0" anchor="ctr"/>
-          <a:lstStyle/>
-          <a:p>
-            <a:pPr algn="ctr"/>
-            <a:endParaRPr lang="en-US"/>
-          </a:p>
-        </p:txBody>
-      </p:sp>
       <p:pic>
         <p:nvPicPr>
           <p:cNvPr id="5" name="Picture 4">
             <a:extLst>
               <a:ext uri="{FF2B5EF4-FFF2-40B4-BE49-F238E27FC236}">
-                <a16:creationId xmlns:a16="http://schemas.microsoft.com/office/drawing/2014/main" id="{2778FF5C-B40F-46A4-96E4-8BC433A2A253}"/>
+                <a16:creationId xmlns:a16="http://schemas.microsoft.com/office/drawing/2014/main" id="{5DD237F8-F0C8-4540-B72A-0508493420D1}"/>
               </a:ext>
             </a:extLst>
           </p:cNvPr>
@@ -4209,18 +4156,54 @@
         </p:blipFill>
         <p:spPr>
           <a:xfrm>
-            <a:off x="643467" y="1847766"/>
-            <a:ext cx="10189374" cy="2954917"/>
+            <a:off x="923925" y="2055294"/>
+            <a:ext cx="10344150" cy="2343150"/>
           </a:xfrm>
           <a:prstGeom prst="rect">
             <a:avLst/>
           </a:prstGeom>
         </p:spPr>
       </p:pic>
+      <p:sp>
+        <p:nvSpPr>
+          <p:cNvPr id="6" name="TextBox 5">
+            <a:extLst>
+              <a:ext uri="{FF2B5EF4-FFF2-40B4-BE49-F238E27FC236}">
+                <a16:creationId xmlns:a16="http://schemas.microsoft.com/office/drawing/2014/main" id="{DEE71A8F-C2BA-4B34-A04C-E61AF1F3C08F}"/>
+              </a:ext>
+            </a:extLst>
+          </p:cNvPr>
+          <p:cNvSpPr txBox="1"/>
+          <p:nvPr/>
+        </p:nvSpPr>
+        <p:spPr>
+          <a:xfrm>
+            <a:off x="731520" y="1337912"/>
+            <a:ext cx="1480470" cy="646331"/>
+          </a:xfrm>
+          <a:prstGeom prst="rect">
+            <a:avLst/>
+          </a:prstGeom>
+          <a:noFill/>
+        </p:spPr>
+        <p:txBody>
+          <a:bodyPr wrap="none" rtlCol="0">
+            <a:spAutoFit/>
+          </a:bodyPr>
+          <a:lstStyle/>
+          <a:p>
+            <a:r>
+              <a:rPr lang="en-US" sz="3600" dirty="0"/>
+              <a:t>From…</a:t>
+            </a:r>
+            <a:endParaRPr lang="en-IL" sz="3600" dirty="0"/>
+          </a:p>
+        </p:txBody>
+      </p:sp>
     </p:spTree>
     <p:extLst>
       <p:ext uri="{BB962C8B-B14F-4D97-AF65-F5344CB8AC3E}">
-        <p14:creationId xmlns:p14="http://schemas.microsoft.com/office/powerpoint/2010/main" val="2774534960"/>
+        <p14:creationId xmlns:p14="http://schemas.microsoft.com/office/powerpoint/2010/main" val="465051069"/>
       </p:ext>
     </p:extLst>
   </p:cSld>
@@ -4532,8 +4515,8 @@
           </a:p>
         </p:txBody>
       </p:sp>
-      <mc:AlternateContent xmlns:mc="http://schemas.openxmlformats.org/markup-compatibility/2006">
-        <mc:Choice xmlns:a14="http://schemas.microsoft.com/office/drawing/2010/main" Requires="a14">
+      <mc:AlternateContent xmlns:mc="http://schemas.openxmlformats.org/markup-compatibility/2006" xmlns:a14="http://schemas.microsoft.com/office/drawing/2010/main">
+        <mc:Choice Requires="a14">
           <p:sp>
             <p:nvSpPr>
               <p:cNvPr id="2" name="TextBox 1">
@@ -4612,7 +4595,7 @@
             </p:txBody>
           </p:sp>
         </mc:Choice>
-        <mc:Fallback>
+        <mc:Fallback xmlns="">
           <p:sp>
             <p:nvSpPr>
               <p:cNvPr id="2" name="TextBox 1">
@@ -5086,8 +5069,8 @@
         </p:nvSpPr>
         <p:spPr>
           <a:xfrm>
-            <a:off x="2927759" y="2111334"/>
-            <a:ext cx="5923801" cy="1015663"/>
+            <a:off x="3547751" y="2027452"/>
+            <a:ext cx="4788490" cy="830997"/>
           </a:xfrm>
           <a:prstGeom prst="rect">
             <a:avLst/>
@@ -5101,16 +5084,78 @@
           <a:lstStyle/>
           <a:p>
             <a:r>
-              <a:rPr lang="en-US" sz="6000" dirty="0"/>
-              <a:t>Part 3. Application</a:t>
-            </a:r>
+              <a:rPr lang="en-US" sz="4800" dirty="0"/>
+              <a:t>Part 3: Application</a:t>
+            </a:r>
+          </a:p>
+        </p:txBody>
+      </p:sp>
+      <p:sp>
+        <p:nvSpPr>
+          <p:cNvPr id="2" name="TextBox 1">
+            <a:extLst>
+              <a:ext uri="{FF2B5EF4-FFF2-40B4-BE49-F238E27FC236}">
+                <a16:creationId xmlns:a16="http://schemas.microsoft.com/office/drawing/2014/main" id="{2D137CDD-1F51-47AD-BCFB-25AB626A0801}"/>
+              </a:ext>
+            </a:extLst>
+          </p:cNvPr>
+          <p:cNvSpPr txBox="1"/>
+          <p:nvPr/>
+        </p:nvSpPr>
+        <p:spPr>
+          <a:xfrm>
+            <a:off x="4340994" y="4398746"/>
+            <a:ext cx="3723840" cy="923330"/>
+          </a:xfrm>
+          <a:prstGeom prst="rect">
+            <a:avLst/>
+          </a:prstGeom>
+          <a:noFill/>
+        </p:spPr>
+        <p:txBody>
+          <a:bodyPr wrap="none" rtlCol="0">
+            <a:spAutoFit/>
+          </a:bodyPr>
+          <a:lstStyle/>
+          <a:p>
+            <a:r>
+              <a:rPr lang="en-US" dirty="0" err="1"/>
+              <a:t>Jupyter</a:t>
+            </a:r>
+            <a:r>
+              <a:rPr lang="en-US" dirty="0"/>
+              <a:t> notebooks: </a:t>
+            </a:r>
+            <a:br>
+              <a:rPr lang="en-US" dirty="0"/>
+            </a:br>
+            <a:r>
+              <a:rPr lang="en-US" dirty="0"/>
+              <a:t>	</a:t>
+            </a:r>
+            <a:r>
+              <a:rPr lang="en-US" dirty="0" err="1"/>
+              <a:t>Presentation_sine.ipynb</a:t>
+            </a:r>
+            <a:endParaRPr lang="en-US" dirty="0"/>
+          </a:p>
+          <a:p>
+            <a:r>
+              <a:rPr lang="en-US" dirty="0"/>
+              <a:t>	</a:t>
+            </a:r>
+            <a:r>
+              <a:rPr lang="en-US" dirty="0" err="1"/>
+              <a:t>Presentation_effiency.ipynb</a:t>
+            </a:r>
+            <a:endParaRPr lang="en-US" dirty="0"/>
           </a:p>
         </p:txBody>
       </p:sp>
     </p:spTree>
     <p:extLst>
       <p:ext uri="{BB962C8B-B14F-4D97-AF65-F5344CB8AC3E}">
-        <p14:creationId xmlns:p14="http://schemas.microsoft.com/office/powerpoint/2010/main" val="127759694"/>
+        <p14:creationId xmlns:p14="http://schemas.microsoft.com/office/powerpoint/2010/main" val="2491948343"/>
       </p:ext>
     </p:extLst>
   </p:cSld>
@@ -5151,8 +5196,8 @@
         </p:nvSpPr>
         <p:spPr>
           <a:xfrm>
-            <a:off x="721454" y="2413337"/>
-            <a:ext cx="10375276" cy="1015663"/>
+            <a:off x="3738172" y="1209304"/>
+            <a:ext cx="4715650" cy="830997"/>
           </a:xfrm>
           <a:prstGeom prst="rect">
             <a:avLst/>
@@ -5166,17 +5211,46 @@
           <a:lstStyle/>
           <a:p>
             <a:r>
-              <a:rPr lang="en-US" sz="6000" dirty="0"/>
-              <a:t>Part 1. Donald Duck - Motivation</a:t>
-            </a:r>
-            <a:endParaRPr lang="en-IL" sz="6000" dirty="0"/>
-          </a:p>
-        </p:txBody>
-      </p:sp>
+              <a:rPr lang="en-US" sz="4800" dirty="0"/>
+              <a:t>Part 1: Motivation</a:t>
+            </a:r>
+          </a:p>
+        </p:txBody>
+      </p:sp>
+      <p:pic>
+        <p:nvPicPr>
+          <p:cNvPr id="5" name="Picture 4">
+            <a:extLst>
+              <a:ext uri="{FF2B5EF4-FFF2-40B4-BE49-F238E27FC236}">
+                <a16:creationId xmlns:a16="http://schemas.microsoft.com/office/drawing/2014/main" id="{A322047E-07B5-41A4-BA25-ADB199919247}"/>
+              </a:ext>
+            </a:extLst>
+          </p:cNvPr>
+          <p:cNvPicPr>
+            <a:picLocks noChangeAspect="1"/>
+          </p:cNvPicPr>
+          <p:nvPr/>
+        </p:nvPicPr>
+        <p:blipFill>
+          <a:blip r:embed="rId3"/>
+          <a:stretch>
+            <a:fillRect/>
+          </a:stretch>
+        </p:blipFill>
+        <p:spPr>
+          <a:xfrm>
+            <a:off x="1001310" y="2693779"/>
+            <a:ext cx="10189374" cy="2954917"/>
+          </a:xfrm>
+          <a:prstGeom prst="rect">
+            <a:avLst/>
+          </a:prstGeom>
+        </p:spPr>
+      </p:pic>
     </p:spTree>
     <p:extLst>
       <p:ext uri="{BB962C8B-B14F-4D97-AF65-F5344CB8AC3E}">
-        <p14:creationId xmlns:p14="http://schemas.microsoft.com/office/powerpoint/2010/main" val="3375753177"/>
+        <p14:creationId xmlns:p14="http://schemas.microsoft.com/office/powerpoint/2010/main" val="4039118143"/>
       </p:ext>
     </p:extLst>
   </p:cSld>

</xml_diff>

<commit_message>
updated presentation to include future ideas
</commit_message>
<xml_diff>
--- a/Presentation.pptx
+++ b/Presentation.pptx
@@ -5,7 +5,7 @@
     <p:sldMasterId id="2147483648" r:id="rId1"/>
   </p:sldMasterIdLst>
   <p:notesMasterIdLst>
-    <p:notesMasterId r:id="rId17"/>
+    <p:notesMasterId r:id="rId18"/>
   </p:notesMasterIdLst>
   <p:sldIdLst>
     <p:sldId id="277" r:id="rId2"/>
@@ -23,6 +23,7 @@
     <p:sldId id="271" r:id="rId14"/>
     <p:sldId id="270" r:id="rId15"/>
     <p:sldId id="276" r:id="rId16"/>
+    <p:sldId id="279" r:id="rId17"/>
   </p:sldIdLst>
   <p:sldSz cx="12192000" cy="6858000"/>
   <p:notesSz cx="6858000" cy="9144000"/>
@@ -211,7 +212,7 @@
           <a:p>
             <a:fld id="{FA8BC687-19B8-4801-B661-85A8EBD1126A}" type="datetimeFigureOut">
               <a:rPr lang="en-IL" smtClean="0"/>
-              <a:t>04/11/2021</a:t>
+              <a:t>06/11/2021</a:t>
             </a:fld>
             <a:endParaRPr lang="en-IL"/>
           </a:p>
@@ -1048,7 +1049,7 @@
           <a:p>
             <a:fld id="{5FE0C212-9962-47B7-B9ED-F32951E708E6}" type="datetimeFigureOut">
               <a:rPr lang="en-IL" smtClean="0"/>
-              <a:t>04/11/2021</a:t>
+              <a:t>06/11/2021</a:t>
             </a:fld>
             <a:endParaRPr lang="en-IL"/>
           </a:p>
@@ -1248,7 +1249,7 @@
           <a:p>
             <a:fld id="{5FE0C212-9962-47B7-B9ED-F32951E708E6}" type="datetimeFigureOut">
               <a:rPr lang="en-IL" smtClean="0"/>
-              <a:t>04/11/2021</a:t>
+              <a:t>06/11/2021</a:t>
             </a:fld>
             <a:endParaRPr lang="en-IL"/>
           </a:p>
@@ -1458,7 +1459,7 @@
           <a:p>
             <a:fld id="{5FE0C212-9962-47B7-B9ED-F32951E708E6}" type="datetimeFigureOut">
               <a:rPr lang="en-IL" smtClean="0"/>
-              <a:t>04/11/2021</a:t>
+              <a:t>06/11/2021</a:t>
             </a:fld>
             <a:endParaRPr lang="en-IL"/>
           </a:p>
@@ -1658,7 +1659,7 @@
           <a:p>
             <a:fld id="{5FE0C212-9962-47B7-B9ED-F32951E708E6}" type="datetimeFigureOut">
               <a:rPr lang="en-IL" smtClean="0"/>
-              <a:t>04/11/2021</a:t>
+              <a:t>06/11/2021</a:t>
             </a:fld>
             <a:endParaRPr lang="en-IL"/>
           </a:p>
@@ -1934,7 +1935,7 @@
           <a:p>
             <a:fld id="{5FE0C212-9962-47B7-B9ED-F32951E708E6}" type="datetimeFigureOut">
               <a:rPr lang="en-IL" smtClean="0"/>
-              <a:t>04/11/2021</a:t>
+              <a:t>06/11/2021</a:t>
             </a:fld>
             <a:endParaRPr lang="en-IL"/>
           </a:p>
@@ -2202,7 +2203,7 @@
           <a:p>
             <a:fld id="{5FE0C212-9962-47B7-B9ED-F32951E708E6}" type="datetimeFigureOut">
               <a:rPr lang="en-IL" smtClean="0"/>
-              <a:t>04/11/2021</a:t>
+              <a:t>06/11/2021</a:t>
             </a:fld>
             <a:endParaRPr lang="en-IL"/>
           </a:p>
@@ -2617,7 +2618,7 @@
           <a:p>
             <a:fld id="{5FE0C212-9962-47B7-B9ED-F32951E708E6}" type="datetimeFigureOut">
               <a:rPr lang="en-IL" smtClean="0"/>
-              <a:t>04/11/2021</a:t>
+              <a:t>06/11/2021</a:t>
             </a:fld>
             <a:endParaRPr lang="en-IL"/>
           </a:p>
@@ -2759,7 +2760,7 @@
           <a:p>
             <a:fld id="{5FE0C212-9962-47B7-B9ED-F32951E708E6}" type="datetimeFigureOut">
               <a:rPr lang="en-IL" smtClean="0"/>
-              <a:t>04/11/2021</a:t>
+              <a:t>06/11/2021</a:t>
             </a:fld>
             <a:endParaRPr lang="en-IL"/>
           </a:p>
@@ -2872,7 +2873,7 @@
           <a:p>
             <a:fld id="{5FE0C212-9962-47B7-B9ED-F32951E708E6}" type="datetimeFigureOut">
               <a:rPr lang="en-IL" smtClean="0"/>
-              <a:t>04/11/2021</a:t>
+              <a:t>06/11/2021</a:t>
             </a:fld>
             <a:endParaRPr lang="en-IL"/>
           </a:p>
@@ -3185,7 +3186,7 @@
           <a:p>
             <a:fld id="{5FE0C212-9962-47B7-B9ED-F32951E708E6}" type="datetimeFigureOut">
               <a:rPr lang="en-IL" smtClean="0"/>
-              <a:t>04/11/2021</a:t>
+              <a:t>06/11/2021</a:t>
             </a:fld>
             <a:endParaRPr lang="en-IL"/>
           </a:p>
@@ -3474,7 +3475,7 @@
           <a:p>
             <a:fld id="{5FE0C212-9962-47B7-B9ED-F32951E708E6}" type="datetimeFigureOut">
               <a:rPr lang="en-IL" smtClean="0"/>
-              <a:t>04/11/2021</a:t>
+              <a:t>06/11/2021</a:t>
             </a:fld>
             <a:endParaRPr lang="en-IL"/>
           </a:p>
@@ -3717,7 +3718,7 @@
           <a:p>
             <a:fld id="{5FE0C212-9962-47B7-B9ED-F32951E708E6}" type="datetimeFigureOut">
               <a:rPr lang="en-IL" smtClean="0"/>
-              <a:t>04/11/2021</a:t>
+              <a:t>06/11/2021</a:t>
             </a:fld>
             <a:endParaRPr lang="en-IL"/>
           </a:p>
@@ -5156,6 +5157,878 @@
     <p:extLst>
       <p:ext uri="{BB962C8B-B14F-4D97-AF65-F5344CB8AC3E}">
         <p14:creationId xmlns:p14="http://schemas.microsoft.com/office/powerpoint/2010/main" val="2491948343"/>
+      </p:ext>
+    </p:extLst>
+  </p:cSld>
+  <p:clrMapOvr>
+    <a:masterClrMapping/>
+  </p:clrMapOvr>
+</p:sld>
+</file>
+
+<file path=ppt/slides/slide16.xml><?xml version="1.0" encoding="utf-8"?>
+<p:sld xmlns:a="http://schemas.openxmlformats.org/drawingml/2006/main" xmlns:r="http://schemas.openxmlformats.org/officeDocument/2006/relationships" xmlns:p="http://schemas.openxmlformats.org/presentationml/2006/main">
+  <p:cSld>
+    <p:spTree>
+      <p:nvGrpSpPr>
+        <p:cNvPr id="1" name=""/>
+        <p:cNvGrpSpPr/>
+        <p:nvPr/>
+      </p:nvGrpSpPr>
+      <p:grpSpPr>
+        <a:xfrm>
+          <a:off x="0" y="0"/>
+          <a:ext cx="0" cy="0"/>
+          <a:chOff x="0" y="0"/>
+          <a:chExt cx="0" cy="0"/>
+        </a:xfrm>
+      </p:grpSpPr>
+      <p:sp>
+        <p:nvSpPr>
+          <p:cNvPr id="4" name="TextBox 3">
+            <a:extLst>
+              <a:ext uri="{FF2B5EF4-FFF2-40B4-BE49-F238E27FC236}">
+                <a16:creationId xmlns:a16="http://schemas.microsoft.com/office/drawing/2014/main" id="{E2B6A650-83EB-462D-B557-08373F787BCC}"/>
+              </a:ext>
+            </a:extLst>
+          </p:cNvPr>
+          <p:cNvSpPr txBox="1"/>
+          <p:nvPr/>
+        </p:nvSpPr>
+        <p:spPr>
+          <a:xfrm>
+            <a:off x="433136" y="510139"/>
+            <a:ext cx="8114097" cy="707886"/>
+          </a:xfrm>
+          <a:prstGeom prst="rect">
+            <a:avLst/>
+          </a:prstGeom>
+          <a:noFill/>
+        </p:spPr>
+        <p:txBody>
+          <a:bodyPr wrap="square" rtlCol="0">
+            <a:spAutoFit/>
+          </a:bodyPr>
+          <a:lstStyle/>
+          <a:p>
+            <a:r>
+              <a:rPr lang="en-US" sz="2000" dirty="0"/>
+              <a:t>Where can we apply a method that is efficient for the representation of really small numbers?</a:t>
+            </a:r>
+            <a:endParaRPr lang="en-IL" sz="2000" dirty="0"/>
+          </a:p>
+        </p:txBody>
+      </p:sp>
+      <mc:AlternateContent xmlns:mc="http://schemas.openxmlformats.org/markup-compatibility/2006">
+        <mc:Choice xmlns:a14="http://schemas.microsoft.com/office/drawing/2010/main" Requires="a14">
+          <p:sp>
+            <p:nvSpPr>
+              <p:cNvPr id="5" name="TextBox 4">
+                <a:extLst>
+                  <a:ext uri="{FF2B5EF4-FFF2-40B4-BE49-F238E27FC236}">
+                    <a16:creationId xmlns:a16="http://schemas.microsoft.com/office/drawing/2014/main" id="{DDCADEC1-A176-40A7-9616-43391DB7F887}"/>
+                  </a:ext>
+                </a:extLst>
+              </p:cNvPr>
+              <p:cNvSpPr txBox="1"/>
+              <p:nvPr/>
+            </p:nvSpPr>
+            <p:spPr>
+              <a:xfrm>
+                <a:off x="2096702" y="1249275"/>
+                <a:ext cx="8471837" cy="2554545"/>
+              </a:xfrm>
+              <a:prstGeom prst="rect">
+                <a:avLst/>
+              </a:prstGeom>
+              <a:noFill/>
+            </p:spPr>
+            <p:txBody>
+              <a:bodyPr wrap="square" rtlCol="0">
+                <a:spAutoFit/>
+              </a:bodyPr>
+              <a:lstStyle/>
+              <a:p>
+                <a:r>
+                  <a:rPr lang="en-US" sz="2000" dirty="0"/>
+                  <a:t>Idea - Stiff problems:</a:t>
+                </a:r>
+              </a:p>
+              <a:p>
+                <a:endParaRPr lang="en-US" sz="2000" dirty="0"/>
+              </a:p>
+              <a:p>
+                <a14:m>
+                  <m:oMathPara xmlns:m="http://schemas.openxmlformats.org/officeDocument/2006/math">
+                    <m:oMathParaPr>
+                      <m:jc m:val="centerGroup"/>
+                    </m:oMathParaPr>
+                    <m:oMath xmlns:m="http://schemas.openxmlformats.org/officeDocument/2006/math">
+                      <m:r>
+                        <a:rPr lang="en-US" sz="2000" b="0" i="1" smtClean="0">
+                          <a:latin typeface="Cambria Math" panose="02040503050406030204" pitchFamily="18" charset="0"/>
+                        </a:rPr>
+                        <m:t>𝐼</m:t>
+                      </m:r>
+                      <m:acc>
+                        <m:accPr>
+                          <m:chr m:val="̈"/>
+                          <m:ctrlPr>
+                            <a:rPr lang="en-US" sz="2000" b="0" i="1" smtClean="0">
+                              <a:latin typeface="Cambria Math" panose="02040503050406030204" pitchFamily="18" charset="0"/>
+                            </a:rPr>
+                          </m:ctrlPr>
+                        </m:accPr>
+                        <m:e>
+                          <m:r>
+                            <a:rPr lang="en-US" sz="2000" b="0" i="1" smtClean="0">
+                              <a:latin typeface="Cambria Math" panose="02040503050406030204" pitchFamily="18" charset="0"/>
+                            </a:rPr>
+                            <m:t>𝑥</m:t>
+                          </m:r>
+                        </m:e>
+                      </m:acc>
+                      <m:r>
+                        <a:rPr lang="en-US" sz="2000" b="0" i="1" dirty="0" smtClean="0">
+                          <a:latin typeface="Cambria Math" panose="02040503050406030204" pitchFamily="18" charset="0"/>
+                        </a:rPr>
+                        <m:t>+</m:t>
+                      </m:r>
+                      <m:r>
+                        <a:rPr lang="en-US" sz="2000" b="0" i="1" dirty="0" smtClean="0">
+                          <a:latin typeface="Cambria Math" panose="02040503050406030204" pitchFamily="18" charset="0"/>
+                        </a:rPr>
+                        <m:t>𝐾𝑥</m:t>
+                      </m:r>
+                      <m:r>
+                        <a:rPr lang="en-US" sz="2000" b="0" i="1" dirty="0" smtClean="0">
+                          <a:latin typeface="Cambria Math" panose="02040503050406030204" pitchFamily="18" charset="0"/>
+                        </a:rPr>
+                        <m:t>=</m:t>
+                      </m:r>
+                      <m:r>
+                        <a:rPr lang="en-US" sz="2000" b="0" i="1" dirty="0" smtClean="0">
+                          <a:latin typeface="Cambria Math" panose="02040503050406030204" pitchFamily="18" charset="0"/>
+                        </a:rPr>
+                        <m:t>𝐹</m:t>
+                      </m:r>
+                    </m:oMath>
+                  </m:oMathPara>
+                </a14:m>
+                <a:endParaRPr lang="en-US" sz="2000" dirty="0"/>
+              </a:p>
+              <a:p>
+                <a:endParaRPr lang="en-US" sz="2000" dirty="0"/>
+              </a:p>
+              <a:p>
+                <a:r>
+                  <a:rPr lang="en-US" sz="2000" dirty="0"/>
+                  <a:t>If </a:t>
+                </a:r>
+                <a14:m>
+                  <m:oMath xmlns:m="http://schemas.openxmlformats.org/officeDocument/2006/math">
+                    <m:r>
+                      <a:rPr lang="en-US" sz="2000" i="1" dirty="0" smtClean="0">
+                        <a:latin typeface="Cambria Math" panose="02040503050406030204" pitchFamily="18" charset="0"/>
+                      </a:rPr>
+                      <m:t>𝜌</m:t>
+                    </m:r>
+                    <m:r>
+                      <a:rPr lang="en-US" sz="2000" b="0" i="1" dirty="0" smtClean="0">
+                        <a:latin typeface="Cambria Math" panose="02040503050406030204" pitchFamily="18" charset="0"/>
+                      </a:rPr>
+                      <m:t>(</m:t>
+                    </m:r>
+                    <m:r>
+                      <a:rPr lang="en-US" sz="2000" b="0" i="1" smtClean="0">
+                        <a:latin typeface="Cambria Math" panose="02040503050406030204" pitchFamily="18" charset="0"/>
+                      </a:rPr>
+                      <m:t>𝐾</m:t>
+                    </m:r>
+                  </m:oMath>
+                </a14:m>
+                <a:r>
+                  <a:rPr lang="en-US" sz="2000" dirty="0"/>
+                  <a:t>)&gt;&gt;1:</a:t>
+                </a:r>
+              </a:p>
+              <a:p>
+                <a:r>
+                  <a:rPr lang="en-US" sz="2000" dirty="0"/>
+                  <a:t>	really small values of </a:t>
+                </a:r>
+                <a14:m>
+                  <m:oMath xmlns:m="http://schemas.openxmlformats.org/officeDocument/2006/math">
+                    <m:r>
+                      <a:rPr lang="en-US" sz="2000" b="0" i="1" smtClean="0">
+                        <a:latin typeface="Cambria Math" panose="02040503050406030204" pitchFamily="18" charset="0"/>
+                      </a:rPr>
+                      <m:t>𝑥</m:t>
+                    </m:r>
+                  </m:oMath>
+                </a14:m>
+                <a:r>
+                  <a:rPr lang="en-US" sz="2000" dirty="0"/>
+                  <a:t> will cause for extremely great spring forces </a:t>
+                </a:r>
+                <a14:m>
+                  <m:oMath xmlns:m="http://schemas.openxmlformats.org/officeDocument/2006/math">
+                    <m:r>
+                      <a:rPr lang="en-US" sz="2000" b="0" i="1" smtClean="0">
+                        <a:latin typeface="Cambria Math" panose="02040503050406030204" pitchFamily="18" charset="0"/>
+                      </a:rPr>
+                      <m:t>𝐾𝑥</m:t>
+                    </m:r>
+                  </m:oMath>
+                </a14:m>
+                <a:r>
+                  <a:rPr lang="en-US" sz="2000" dirty="0"/>
+                  <a:t>.</a:t>
+                </a:r>
+              </a:p>
+              <a:p>
+                <a:endParaRPr lang="en-US" sz="2000" dirty="0"/>
+              </a:p>
+              <a:p>
+                <a:r>
+                  <a:rPr lang="en-US" sz="2000" dirty="0"/>
+                  <a:t>Solving this equation accurately requires a big number range</a:t>
+                </a:r>
+              </a:p>
+            </p:txBody>
+          </p:sp>
+        </mc:Choice>
+        <mc:Fallback>
+          <p:sp>
+            <p:nvSpPr>
+              <p:cNvPr id="5" name="TextBox 4">
+                <a:extLst>
+                  <a:ext uri="{FF2B5EF4-FFF2-40B4-BE49-F238E27FC236}">
+                    <a16:creationId xmlns:a16="http://schemas.microsoft.com/office/drawing/2014/main" id="{DDCADEC1-A176-40A7-9616-43391DB7F887}"/>
+                  </a:ext>
+                </a:extLst>
+              </p:cNvPr>
+              <p:cNvSpPr txBox="1">
+                <a:spLocks noRot="1" noChangeAspect="1" noMove="1" noResize="1" noEditPoints="1" noAdjustHandles="1" noChangeArrowheads="1" noChangeShapeType="1" noTextEdit="1"/>
+              </p:cNvSpPr>
+              <p:nvPr/>
+            </p:nvSpPr>
+            <p:spPr>
+              <a:xfrm>
+                <a:off x="2096702" y="1249275"/>
+                <a:ext cx="8471837" cy="2554545"/>
+              </a:xfrm>
+              <a:prstGeom prst="rect">
+                <a:avLst/>
+              </a:prstGeom>
+              <a:blipFill>
+                <a:blip r:embed="rId2"/>
+                <a:stretch>
+                  <a:fillRect l="-791" t="-1432" b="-3341"/>
+                </a:stretch>
+              </a:blipFill>
+            </p:spPr>
+            <p:txBody>
+              <a:bodyPr/>
+              <a:lstStyle/>
+              <a:p>
+                <a:r>
+                  <a:rPr lang="en-IL">
+                    <a:noFill/>
+                  </a:rPr>
+                  <a:t> </a:t>
+                </a:r>
+              </a:p>
+            </p:txBody>
+          </p:sp>
+        </mc:Fallback>
+      </mc:AlternateContent>
+      <p:sp>
+        <p:nvSpPr>
+          <p:cNvPr id="6" name="TextBox 5">
+            <a:extLst>
+              <a:ext uri="{FF2B5EF4-FFF2-40B4-BE49-F238E27FC236}">
+                <a16:creationId xmlns:a16="http://schemas.microsoft.com/office/drawing/2014/main" id="{318E7811-CC1A-4287-89D6-48D1428121A6}"/>
+              </a:ext>
+            </a:extLst>
+          </p:cNvPr>
+          <p:cNvSpPr txBox="1"/>
+          <p:nvPr/>
+        </p:nvSpPr>
+        <p:spPr>
+          <a:xfrm>
+            <a:off x="433136" y="3851674"/>
+            <a:ext cx="8114097" cy="400110"/>
+          </a:xfrm>
+          <a:prstGeom prst="rect">
+            <a:avLst/>
+          </a:prstGeom>
+          <a:noFill/>
+        </p:spPr>
+        <p:txBody>
+          <a:bodyPr wrap="square" rtlCol="0">
+            <a:spAutoFit/>
+          </a:bodyPr>
+          <a:lstStyle/>
+          <a:p>
+            <a:r>
+              <a:rPr lang="en-US" sz="2000" dirty="0"/>
+              <a:t>Can we learn to do efficient arithmetic using the new method?</a:t>
+            </a:r>
+          </a:p>
+        </p:txBody>
+      </p:sp>
+      <mc:AlternateContent xmlns:mc="http://schemas.openxmlformats.org/markup-compatibility/2006">
+        <mc:Choice xmlns:a14="http://schemas.microsoft.com/office/drawing/2010/main" Requires="a14">
+          <p:sp>
+            <p:nvSpPr>
+              <p:cNvPr id="7" name="TextBox 6">
+                <a:extLst>
+                  <a:ext uri="{FF2B5EF4-FFF2-40B4-BE49-F238E27FC236}">
+                    <a16:creationId xmlns:a16="http://schemas.microsoft.com/office/drawing/2014/main" id="{B3A767B1-5A14-4D12-9D92-A16039302A75}"/>
+                  </a:ext>
+                </a:extLst>
+              </p:cNvPr>
+              <p:cNvSpPr txBox="1"/>
+              <p:nvPr/>
+            </p:nvSpPr>
+            <p:spPr>
+              <a:xfrm>
+                <a:off x="2038951" y="4465396"/>
+                <a:ext cx="8114097" cy="1363643"/>
+              </a:xfrm>
+              <a:prstGeom prst="rect">
+                <a:avLst/>
+              </a:prstGeom>
+              <a:noFill/>
+            </p:spPr>
+            <p:txBody>
+              <a:bodyPr wrap="square" rtlCol="0">
+                <a:spAutoFit/>
+              </a:bodyPr>
+              <a:lstStyle/>
+              <a:p>
+                <a14:m>
+                  <m:oMathPara xmlns:m="http://schemas.openxmlformats.org/officeDocument/2006/math">
+                    <m:oMathParaPr>
+                      <m:jc m:val="centerGroup"/>
+                    </m:oMathParaPr>
+                    <m:oMath xmlns:m="http://schemas.openxmlformats.org/officeDocument/2006/math">
+                      <m:r>
+                        <a:rPr lang="en-US" sz="2000" b="0" i="1" smtClean="0">
+                          <a:latin typeface="Cambria Math" panose="02040503050406030204" pitchFamily="18" charset="0"/>
+                        </a:rPr>
+                        <m:t>𝑣</m:t>
+                      </m:r>
+                      <m:r>
+                        <a:rPr lang="en-US" sz="2000" b="0" i="1" smtClean="0">
+                          <a:latin typeface="Cambria Math" panose="02040503050406030204" pitchFamily="18" charset="0"/>
+                        </a:rPr>
+                        <m:t>~ </m:t>
+                      </m:r>
+                      <m:sSub>
+                        <m:sSubPr>
+                          <m:ctrlPr>
+                            <a:rPr lang="en-US" sz="2000" b="0" i="1" smtClean="0">
+                              <a:latin typeface="Cambria Math" panose="02040503050406030204" pitchFamily="18" charset="0"/>
+                            </a:rPr>
+                          </m:ctrlPr>
+                        </m:sSubPr>
+                        <m:e>
+                          <m:r>
+                            <a:rPr lang="en-US" sz="2000" b="0" i="1" smtClean="0">
+                              <a:latin typeface="Cambria Math" panose="02040503050406030204" pitchFamily="18" charset="0"/>
+                            </a:rPr>
+                            <m:t>𝛼</m:t>
+                          </m:r>
+                        </m:e>
+                        <m:sub>
+                          <m:r>
+                            <a:rPr lang="en-US" sz="2000" b="0" i="1" smtClean="0">
+                              <a:latin typeface="Cambria Math" panose="02040503050406030204" pitchFamily="18" charset="0"/>
+                            </a:rPr>
+                            <m:t>0,</m:t>
+                          </m:r>
+                          <m:r>
+                            <a:rPr lang="en-US" sz="2000" b="0" i="1" smtClean="0">
+                              <a:latin typeface="Cambria Math" panose="02040503050406030204" pitchFamily="18" charset="0"/>
+                            </a:rPr>
+                            <m:t>𝑣</m:t>
+                          </m:r>
+                        </m:sub>
+                      </m:sSub>
+                      <m:r>
+                        <a:rPr lang="en-US" sz="2000" b="0" i="1" smtClean="0">
+                          <a:latin typeface="Cambria Math" panose="02040503050406030204" pitchFamily="18" charset="0"/>
+                        </a:rPr>
+                        <m:t>,</m:t>
+                      </m:r>
+                      <m:r>
+                        <a:rPr lang="en-US" sz="2000" b="0" i="1" smtClean="0">
+                          <a:latin typeface="Cambria Math" panose="02040503050406030204" pitchFamily="18" charset="0"/>
+                        </a:rPr>
+                        <m:t>𝜏</m:t>
+                      </m:r>
+                      <m:r>
+                        <a:rPr lang="en-US" sz="2000" b="0" i="1" smtClean="0">
+                          <a:latin typeface="Cambria Math" panose="02040503050406030204" pitchFamily="18" charset="0"/>
+                        </a:rPr>
+                        <m:t>,</m:t>
+                      </m:r>
+                      <m:r>
+                        <a:rPr lang="en-US" sz="2000" b="0" i="1" smtClean="0">
+                          <a:latin typeface="Cambria Math" panose="02040503050406030204" pitchFamily="18" charset="0"/>
+                        </a:rPr>
+                        <m:t>𝑛</m:t>
+                      </m:r>
+                      <m:r>
+                        <a:rPr lang="en-US" sz="2000" b="0" i="1" smtClean="0">
+                          <a:latin typeface="Cambria Math" panose="02040503050406030204" pitchFamily="18" charset="0"/>
+                        </a:rPr>
+                        <m:t>,1</m:t>
+                      </m:r>
+                    </m:oMath>
+                  </m:oMathPara>
+                </a14:m>
+                <a:endParaRPr lang="en-US" sz="2000" dirty="0"/>
+              </a:p>
+              <a:p>
+                <a14:m>
+                  <m:oMathPara xmlns:m="http://schemas.openxmlformats.org/officeDocument/2006/math">
+                    <m:oMathParaPr>
+                      <m:jc m:val="centerGroup"/>
+                    </m:oMathParaPr>
+                    <m:oMath xmlns:m="http://schemas.openxmlformats.org/officeDocument/2006/math">
+                      <m:r>
+                        <a:rPr lang="en-US" sz="2000" b="0" i="1" smtClean="0">
+                          <a:latin typeface="Cambria Math" panose="02040503050406030204" pitchFamily="18" charset="0"/>
+                        </a:rPr>
+                        <m:t>𝑀</m:t>
+                      </m:r>
+                      <m:r>
+                        <a:rPr lang="en-US" sz="2000" b="0" i="1" smtClean="0">
+                          <a:latin typeface="Cambria Math" panose="02040503050406030204" pitchFamily="18" charset="0"/>
+                        </a:rPr>
+                        <m:t>~</m:t>
+                      </m:r>
+                      <m:sSub>
+                        <m:sSubPr>
+                          <m:ctrlPr>
+                            <a:rPr lang="en-US" sz="2000" b="0" i="1" smtClean="0">
+                              <a:latin typeface="Cambria Math" panose="02040503050406030204" pitchFamily="18" charset="0"/>
+                            </a:rPr>
+                          </m:ctrlPr>
+                        </m:sSubPr>
+                        <m:e>
+                          <m:r>
+                            <a:rPr lang="en-US" sz="2000" b="0" i="1" smtClean="0">
+                              <a:latin typeface="Cambria Math" panose="02040503050406030204" pitchFamily="18" charset="0"/>
+                            </a:rPr>
+                            <m:t>𝛼</m:t>
+                          </m:r>
+                        </m:e>
+                        <m:sub>
+                          <m:r>
+                            <a:rPr lang="en-US" sz="2000" b="0" i="1" smtClean="0">
+                              <a:latin typeface="Cambria Math" panose="02040503050406030204" pitchFamily="18" charset="0"/>
+                            </a:rPr>
+                            <m:t>0,</m:t>
+                          </m:r>
+                          <m:r>
+                            <a:rPr lang="en-US" sz="2000" b="0" i="1" smtClean="0">
+                              <a:latin typeface="Cambria Math" panose="02040503050406030204" pitchFamily="18" charset="0"/>
+                            </a:rPr>
+                            <m:t>𝑀</m:t>
+                          </m:r>
+                        </m:sub>
+                      </m:sSub>
+                      <m:r>
+                        <a:rPr lang="en-US" sz="2000" b="0" i="1" smtClean="0">
+                          <a:latin typeface="Cambria Math" panose="02040503050406030204" pitchFamily="18" charset="0"/>
+                        </a:rPr>
+                        <m:t>,</m:t>
+                      </m:r>
+                      <m:r>
+                        <a:rPr lang="en-US" sz="2000" b="0" i="1" smtClean="0">
+                          <a:latin typeface="Cambria Math" panose="02040503050406030204" pitchFamily="18" charset="0"/>
+                        </a:rPr>
+                        <m:t>𝜏</m:t>
+                      </m:r>
+                      <m:r>
+                        <a:rPr lang="en-US" sz="2000" b="0" i="1" smtClean="0">
+                          <a:latin typeface="Cambria Math" panose="02040503050406030204" pitchFamily="18" charset="0"/>
+                        </a:rPr>
+                        <m:t>,</m:t>
+                      </m:r>
+                      <m:r>
+                        <a:rPr lang="en-US" sz="2000" b="0" i="1" smtClean="0">
+                          <a:latin typeface="Cambria Math" panose="02040503050406030204" pitchFamily="18" charset="0"/>
+                        </a:rPr>
+                        <m:t>𝑛</m:t>
+                      </m:r>
+                      <m:r>
+                        <a:rPr lang="en-US" sz="2000" b="0" i="1" smtClean="0">
+                          <a:latin typeface="Cambria Math" panose="02040503050406030204" pitchFamily="18" charset="0"/>
+                        </a:rPr>
+                        <m:t>,</m:t>
+                      </m:r>
+                      <m:r>
+                        <a:rPr lang="en-US" sz="2000" b="0" i="1" smtClean="0">
+                          <a:latin typeface="Cambria Math" panose="02040503050406030204" pitchFamily="18" charset="0"/>
+                        </a:rPr>
+                        <m:t>𝑚</m:t>
+                      </m:r>
+                    </m:oMath>
+                  </m:oMathPara>
+                </a14:m>
+                <a:endParaRPr lang="en-US" sz="2000" dirty="0"/>
+              </a:p>
+              <a:p>
+                <a:endParaRPr lang="en-US" sz="2000" dirty="0"/>
+              </a:p>
+              <a:p>
+                <a14:m>
+                  <m:oMathPara xmlns:m="http://schemas.openxmlformats.org/officeDocument/2006/math">
+                    <m:oMathParaPr>
+                      <m:jc m:val="centerGroup"/>
+                    </m:oMathParaPr>
+                    <m:oMath xmlns:m="http://schemas.openxmlformats.org/officeDocument/2006/math">
+                      <m:r>
+                        <a:rPr lang="en-US" sz="2000" b="0" i="1" smtClean="0">
+                          <a:latin typeface="Cambria Math" panose="02040503050406030204" pitchFamily="18" charset="0"/>
+                        </a:rPr>
+                        <m:t>𝑀𝑣</m:t>
+                      </m:r>
+                      <m:r>
+                        <a:rPr lang="en-US" sz="2000" b="0" i="1" smtClean="0">
+                          <a:latin typeface="Cambria Math" panose="02040503050406030204" pitchFamily="18" charset="0"/>
+                        </a:rPr>
+                        <m:t> ~ </m:t>
+                      </m:r>
+                      <m:sSub>
+                        <m:sSubPr>
+                          <m:ctrlPr>
+                            <a:rPr lang="en-US" sz="2000" b="0" i="1" smtClean="0">
+                              <a:latin typeface="Cambria Math" panose="02040503050406030204" pitchFamily="18" charset="0"/>
+                            </a:rPr>
+                          </m:ctrlPr>
+                        </m:sSubPr>
+                        <m:e>
+                          <m:r>
+                            <a:rPr lang="en-US" sz="2000" b="0" i="1" smtClean="0">
+                              <a:latin typeface="Cambria Math" panose="02040503050406030204" pitchFamily="18" charset="0"/>
+                            </a:rPr>
+                            <m:t>𝛼</m:t>
+                          </m:r>
+                        </m:e>
+                        <m:sub>
+                          <m:r>
+                            <a:rPr lang="en-US" sz="2000" b="0" i="1" smtClean="0">
+                              <a:latin typeface="Cambria Math" panose="02040503050406030204" pitchFamily="18" charset="0"/>
+                            </a:rPr>
+                            <m:t>0,</m:t>
+                          </m:r>
+                          <m:r>
+                            <a:rPr lang="en-US" sz="2000" b="0" i="1" smtClean="0">
+                              <a:latin typeface="Cambria Math" panose="02040503050406030204" pitchFamily="18" charset="0"/>
+                            </a:rPr>
+                            <m:t>𝑀𝑣</m:t>
+                          </m:r>
+                        </m:sub>
+                      </m:sSub>
+                      <m:r>
+                        <a:rPr lang="en-US" sz="2000" b="0" i="1" smtClean="0">
+                          <a:latin typeface="Cambria Math" panose="02040503050406030204" pitchFamily="18" charset="0"/>
+                        </a:rPr>
+                        <m:t>,</m:t>
+                      </m:r>
+                      <m:r>
+                        <a:rPr lang="en-US" sz="2000" b="0" i="1" smtClean="0">
+                          <a:latin typeface="Cambria Math" panose="02040503050406030204" pitchFamily="18" charset="0"/>
+                        </a:rPr>
+                        <m:t>𝜏</m:t>
+                      </m:r>
+                      <m:r>
+                        <a:rPr lang="en-US" sz="2000" b="0" i="1" smtClean="0">
+                          <a:latin typeface="Cambria Math" panose="02040503050406030204" pitchFamily="18" charset="0"/>
+                        </a:rPr>
+                        <m:t>,</m:t>
+                      </m:r>
+                      <m:r>
+                        <a:rPr lang="en-US" sz="2000" b="0" i="1" smtClean="0">
+                          <a:latin typeface="Cambria Math" panose="02040503050406030204" pitchFamily="18" charset="0"/>
+                        </a:rPr>
+                        <m:t>𝑛</m:t>
+                      </m:r>
+                      <m:r>
+                        <a:rPr lang="en-US" sz="2000" b="0" i="1" smtClean="0">
+                          <a:latin typeface="Cambria Math" panose="02040503050406030204" pitchFamily="18" charset="0"/>
+                        </a:rPr>
+                        <m:t>,</m:t>
+                      </m:r>
+                      <m:r>
+                        <a:rPr lang="en-US" sz="2000" b="0" i="1" smtClean="0">
+                          <a:latin typeface="Cambria Math" panose="02040503050406030204" pitchFamily="18" charset="0"/>
+                        </a:rPr>
+                        <m:t>𝑚</m:t>
+                      </m:r>
+                    </m:oMath>
+                  </m:oMathPara>
+                </a14:m>
+                <a:endParaRPr lang="en-US" sz="2000" b="0" dirty="0"/>
+              </a:p>
+            </p:txBody>
+          </p:sp>
+        </mc:Choice>
+        <mc:Fallback>
+          <p:sp>
+            <p:nvSpPr>
+              <p:cNvPr id="7" name="TextBox 6">
+                <a:extLst>
+                  <a:ext uri="{FF2B5EF4-FFF2-40B4-BE49-F238E27FC236}">
+                    <a16:creationId xmlns:a16="http://schemas.microsoft.com/office/drawing/2014/main" id="{B3A767B1-5A14-4D12-9D92-A16039302A75}"/>
+                  </a:ext>
+                </a:extLst>
+              </p:cNvPr>
+              <p:cNvSpPr txBox="1">
+                <a:spLocks noRot="1" noChangeAspect="1" noMove="1" noResize="1" noEditPoints="1" noAdjustHandles="1" noChangeArrowheads="1" noChangeShapeType="1" noTextEdit="1"/>
+              </p:cNvSpPr>
+              <p:nvPr/>
+            </p:nvSpPr>
+            <p:spPr>
+              <a:xfrm>
+                <a:off x="2038951" y="4465396"/>
+                <a:ext cx="8114097" cy="1363643"/>
+              </a:xfrm>
+              <a:prstGeom prst="rect">
+                <a:avLst/>
+              </a:prstGeom>
+              <a:blipFill>
+                <a:blip r:embed="rId3"/>
+                <a:stretch>
+                  <a:fillRect/>
+                </a:stretch>
+              </a:blipFill>
+            </p:spPr>
+            <p:txBody>
+              <a:bodyPr/>
+              <a:lstStyle/>
+              <a:p>
+                <a:r>
+                  <a:rPr lang="en-IL">
+                    <a:noFill/>
+                  </a:rPr>
+                  <a:t> </a:t>
+                </a:r>
+              </a:p>
+            </p:txBody>
+          </p:sp>
+        </mc:Fallback>
+      </mc:AlternateContent>
+      <mc:AlternateContent xmlns:mc="http://schemas.openxmlformats.org/markup-compatibility/2006">
+        <mc:Choice xmlns:a14="http://schemas.microsoft.com/office/drawing/2010/main" Requires="a14">
+          <p:sp>
+            <p:nvSpPr>
+              <p:cNvPr id="8" name="TextBox 7">
+                <a:extLst>
+                  <a:ext uri="{FF2B5EF4-FFF2-40B4-BE49-F238E27FC236}">
+                    <a16:creationId xmlns:a16="http://schemas.microsoft.com/office/drawing/2014/main" id="{A6899A70-F6D5-48B9-AF6A-52D715473C25}"/>
+                  </a:ext>
+                </a:extLst>
+              </p:cNvPr>
+              <p:cNvSpPr txBox="1"/>
+              <p:nvPr/>
+            </p:nvSpPr>
+            <p:spPr>
+              <a:xfrm>
+                <a:off x="433136" y="5910400"/>
+                <a:ext cx="8114097" cy="745973"/>
+              </a:xfrm>
+              <a:prstGeom prst="rect">
+                <a:avLst/>
+              </a:prstGeom>
+              <a:noFill/>
+            </p:spPr>
+            <p:txBody>
+              <a:bodyPr wrap="square" rtlCol="0">
+                <a:spAutoFit/>
+              </a:bodyPr>
+              <a:lstStyle/>
+              <a:p>
+                <a:r>
+                  <a:rPr lang="en-US" sz="2000" dirty="0"/>
+                  <a:t>That is – Is there a shortcut to calculate </a:t>
+                </a:r>
+                <a14:m>
+                  <m:oMath xmlns:m="http://schemas.openxmlformats.org/officeDocument/2006/math">
+                    <m:sSub>
+                      <m:sSubPr>
+                        <m:ctrlPr>
+                          <a:rPr lang="en-US" sz="2000" b="0" i="1" smtClean="0">
+                            <a:latin typeface="Cambria Math" panose="02040503050406030204" pitchFamily="18" charset="0"/>
+                          </a:rPr>
+                        </m:ctrlPr>
+                      </m:sSubPr>
+                      <m:e>
+                        <m:r>
+                          <a:rPr lang="en-US" sz="2000" b="0" i="1" smtClean="0">
+                            <a:latin typeface="Cambria Math" panose="02040503050406030204" pitchFamily="18" charset="0"/>
+                          </a:rPr>
+                          <m:t>𝛼</m:t>
+                        </m:r>
+                      </m:e>
+                      <m:sub>
+                        <m:r>
+                          <a:rPr lang="en-US" sz="2000" b="0" i="1" smtClean="0">
+                            <a:latin typeface="Cambria Math" panose="02040503050406030204" pitchFamily="18" charset="0"/>
+                          </a:rPr>
+                          <m:t>0,</m:t>
+                        </m:r>
+                        <m:r>
+                          <a:rPr lang="en-US" sz="2000" b="0" i="1" smtClean="0">
+                            <a:latin typeface="Cambria Math" panose="02040503050406030204" pitchFamily="18" charset="0"/>
+                          </a:rPr>
+                          <m:t>𝑀𝑣</m:t>
+                        </m:r>
+                      </m:sub>
+                    </m:sSub>
+                  </m:oMath>
+                </a14:m>
+                <a:r>
+                  <a:rPr lang="en-US" sz="2000" dirty="0"/>
+                  <a:t> without extracting all values </a:t>
+                </a:r>
+                <a14:m>
+                  <m:oMath xmlns:m="http://schemas.openxmlformats.org/officeDocument/2006/math">
+                    <m:sSub>
+                      <m:sSubPr>
+                        <m:ctrlPr>
+                          <a:rPr lang="en-US" sz="2000" b="0" i="1" smtClean="0">
+                            <a:latin typeface="Cambria Math" panose="02040503050406030204" pitchFamily="18" charset="0"/>
+                          </a:rPr>
+                        </m:ctrlPr>
+                      </m:sSubPr>
+                      <m:e>
+                        <m:r>
+                          <a:rPr lang="en-US" sz="2000" b="0" i="1" smtClean="0">
+                            <a:latin typeface="Cambria Math" panose="02040503050406030204" pitchFamily="18" charset="0"/>
+                          </a:rPr>
+                          <m:t>𝑣</m:t>
+                        </m:r>
+                      </m:e>
+                      <m:sub>
+                        <m:r>
+                          <a:rPr lang="en-US" sz="2000" b="0" i="1" smtClean="0">
+                            <a:latin typeface="Cambria Math" panose="02040503050406030204" pitchFamily="18" charset="0"/>
+                          </a:rPr>
+                          <m:t>𝑖</m:t>
+                        </m:r>
+                      </m:sub>
+                    </m:sSub>
+                  </m:oMath>
+                </a14:m>
+                <a:r>
+                  <a:rPr lang="en-US" sz="2000" dirty="0"/>
+                  <a:t>, </a:t>
+                </a:r>
+                <a14:m>
+                  <m:oMath xmlns:m="http://schemas.openxmlformats.org/officeDocument/2006/math">
+                    <m:sSub>
+                      <m:sSubPr>
+                        <m:ctrlPr>
+                          <a:rPr lang="en-US" sz="2000" b="0" i="1" smtClean="0">
+                            <a:latin typeface="Cambria Math" panose="02040503050406030204" pitchFamily="18" charset="0"/>
+                          </a:rPr>
+                        </m:ctrlPr>
+                      </m:sSubPr>
+                      <m:e>
+                        <m:r>
+                          <a:rPr lang="en-US" sz="2000" b="0" i="1" smtClean="0">
+                            <a:latin typeface="Cambria Math" panose="02040503050406030204" pitchFamily="18" charset="0"/>
+                          </a:rPr>
+                          <m:t>𝑀</m:t>
+                        </m:r>
+                      </m:e>
+                      <m:sub>
+                        <m:r>
+                          <a:rPr lang="en-US" sz="2000" b="0" i="1" smtClean="0">
+                            <a:latin typeface="Cambria Math" panose="02040503050406030204" pitchFamily="18" charset="0"/>
+                          </a:rPr>
+                          <m:t>𝑖</m:t>
+                        </m:r>
+                        <m:r>
+                          <a:rPr lang="en-US" sz="2000" b="0" i="1" smtClean="0">
+                            <a:latin typeface="Cambria Math" panose="02040503050406030204" pitchFamily="18" charset="0"/>
+                          </a:rPr>
+                          <m:t>,</m:t>
+                        </m:r>
+                        <m:r>
+                          <a:rPr lang="en-US" sz="2000" b="0" i="1" smtClean="0">
+                            <a:latin typeface="Cambria Math" panose="02040503050406030204" pitchFamily="18" charset="0"/>
+                          </a:rPr>
+                          <m:t>𝑗</m:t>
+                        </m:r>
+                      </m:sub>
+                    </m:sSub>
+                  </m:oMath>
+                </a14:m>
+                <a:r>
+                  <a:rPr lang="en-US" sz="2000" dirty="0"/>
+                  <a:t> and then encoding them</a:t>
+                </a:r>
+              </a:p>
+            </p:txBody>
+          </p:sp>
+        </mc:Choice>
+        <mc:Fallback>
+          <p:sp>
+            <p:nvSpPr>
+              <p:cNvPr id="8" name="TextBox 7">
+                <a:extLst>
+                  <a:ext uri="{FF2B5EF4-FFF2-40B4-BE49-F238E27FC236}">
+                    <a16:creationId xmlns:a16="http://schemas.microsoft.com/office/drawing/2014/main" id="{A6899A70-F6D5-48B9-AF6A-52D715473C25}"/>
+                  </a:ext>
+                </a:extLst>
+              </p:cNvPr>
+              <p:cNvSpPr txBox="1">
+                <a:spLocks noRot="1" noChangeAspect="1" noMove="1" noResize="1" noEditPoints="1" noAdjustHandles="1" noChangeArrowheads="1" noChangeShapeType="1" noTextEdit="1"/>
+              </p:cNvSpPr>
+              <p:nvPr/>
+            </p:nvSpPr>
+            <p:spPr>
+              <a:xfrm>
+                <a:off x="433136" y="5910400"/>
+                <a:ext cx="8114097" cy="745973"/>
+              </a:xfrm>
+              <a:prstGeom prst="rect">
+                <a:avLst/>
+              </a:prstGeom>
+              <a:blipFill>
+                <a:blip r:embed="rId4"/>
+                <a:stretch>
+                  <a:fillRect l="-751" t="-4098" b="-11475"/>
+                </a:stretch>
+              </a:blipFill>
+            </p:spPr>
+            <p:txBody>
+              <a:bodyPr/>
+              <a:lstStyle/>
+              <a:p>
+                <a:r>
+                  <a:rPr lang="en-IL">
+                    <a:noFill/>
+                  </a:rPr>
+                  <a:t> </a:t>
+                </a:r>
+              </a:p>
+            </p:txBody>
+          </p:sp>
+        </mc:Fallback>
+      </mc:AlternateContent>
+    </p:spTree>
+    <p:extLst>
+      <p:ext uri="{BB962C8B-B14F-4D97-AF65-F5344CB8AC3E}">
+        <p14:creationId xmlns:p14="http://schemas.microsoft.com/office/powerpoint/2010/main" val="3884919445"/>
       </p:ext>
     </p:extLst>
   </p:cSld>

</xml_diff>